<commit_message>
Added the case study plot.
</commit_message>
<xml_diff>
--- a/chapter_06/figures/shap.pptx
+++ b/chapter_06/figures/shap.pptx
@@ -104,6 +104,11 @@
       </a:defRPr>
     </a:lvl9pPr>
   </p:defaultTextStyle>
+  <p:extLst>
+    <p:ext uri="{EFAFB233-063F-42B5-8137-9DF3F51BA10A}">
+      <p15:sldGuideLst xmlns:p15="http://schemas.microsoft.com/office/powerpoint/2012/main"/>
+    </p:ext>
+  </p:extLst>
 </p:presentation>
 </file>
 
@@ -120,16 +125,24 @@
   <pc:docChgLst>
     <pc:chgData name="Fatima Pillosu" userId="a6295d4dc9e22643" providerId="LiveId" clId="{38507884-2DC1-405C-BE3E-66E3937C3B2D}"/>
     <pc:docChg chg="delSld modSld">
-      <pc:chgData name="Fatima Pillosu" userId="a6295d4dc9e22643" providerId="LiveId" clId="{38507884-2DC1-405C-BE3E-66E3937C3B2D}" dt="2025-07-08T19:57:38.886" v="67" actId="1035"/>
+      <pc:chgData name="Fatima Pillosu" userId="a6295d4dc9e22643" providerId="LiveId" clId="{38507884-2DC1-405C-BE3E-66E3937C3B2D}" dt="2025-07-08T21:40:23.499" v="73" actId="20577"/>
       <pc:docMkLst>
         <pc:docMk/>
       </pc:docMkLst>
       <pc:sldChg chg="addSp modSp mod">
-        <pc:chgData name="Fatima Pillosu" userId="a6295d4dc9e22643" providerId="LiveId" clId="{38507884-2DC1-405C-BE3E-66E3937C3B2D}" dt="2025-07-08T19:57:38.886" v="67" actId="1035"/>
+        <pc:chgData name="Fatima Pillosu" userId="a6295d4dc9e22643" providerId="LiveId" clId="{38507884-2DC1-405C-BE3E-66E3937C3B2D}" dt="2025-07-08T21:40:23.499" v="73" actId="20577"/>
         <pc:sldMkLst>
           <pc:docMk/>
           <pc:sldMk cId="3072774910" sldId="256"/>
         </pc:sldMkLst>
+        <pc:spChg chg="mod">
+          <ac:chgData name="Fatima Pillosu" userId="a6295d4dc9e22643" providerId="LiveId" clId="{38507884-2DC1-405C-BE3E-66E3937C3B2D}" dt="2025-07-08T21:40:23.499" v="73" actId="20577"/>
+          <ac:spMkLst>
+            <pc:docMk/>
+            <pc:sldMk cId="3072774910" sldId="256"/>
+            <ac:spMk id="8" creationId="{07BED41A-D0D7-85DA-E9FA-F8A549A7FB2F}"/>
+          </ac:spMkLst>
+        </pc:spChg>
         <pc:spChg chg="mod">
           <ac:chgData name="Fatima Pillosu" userId="a6295d4dc9e22643" providerId="LiveId" clId="{38507884-2DC1-405C-BE3E-66E3937C3B2D}" dt="2025-07-08T19:57:38.886" v="67" actId="1035"/>
           <ac:spMkLst>
@@ -3450,7 +3463,7 @@
                 <a:latin typeface="Calibri Light" panose="020F0302020204030204" pitchFamily="34" charset="0"/>
                 <a:cs typeface="Calibri Light" panose="020F0302020204030204" pitchFamily="34" charset="0"/>
               </a:rPr>
-              <a:t>Mean SHAP values </a:t>
+              <a:t>Mean abs(SHAP values)</a:t>
             </a:r>
             <a:endParaRPr lang="en-GB" sz="800" b="1" dirty="0">
               <a:solidFill>

</xml_diff>